<commit_message>
latest version of the presentation
</commit_message>
<xml_diff>
--- a/report/Salary_Estimation_App_Development_Report_latest.pptx
+++ b/report/Salary_Estimation_App_Development_Report_latest.pptx
@@ -37,15 +37,15 @@
       <p:italic r:id="rId20"/>
     </p:embeddedFont>
     <p:embeddedFont>
-      <p:font typeface="Calibri" panose="020F0502020204030204" pitchFamily="34" charset="0"/>
+      <p:font typeface="Quintessential"/>
       <p:regular r:id="rId21"/>
-      <p:bold r:id="rId22"/>
-      <p:italic r:id="rId23"/>
-      <p:boldItalic r:id="rId24"/>
     </p:embeddedFont>
     <p:embeddedFont>
-      <p:font typeface="Quintessential"/>
-      <p:regular r:id="rId25"/>
+      <p:font typeface="Calibri" panose="020F0502020204030204" pitchFamily="34" charset="0"/>
+      <p:regular r:id="rId22"/>
+      <p:bold r:id="rId23"/>
+      <p:italic r:id="rId24"/>
+      <p:boldItalic r:id="rId25"/>
     </p:embeddedFont>
   </p:embeddedFontLst>
   <p:defaultTextStyle>
@@ -293,7 +293,7 @@
       </p15:sldGuideLst>
     </p:ext>
     <p:ext uri="GoogleSlidesCustomDataVersion2">
-      <go:slidesCustomData xmlns="" xmlns:mc="http://schemas.openxmlformats.org/markup-compatibility/2006" xmlns:mv="urn:schemas-microsoft-com:mac:vml" xmlns:c="http://schemas.openxmlformats.org/drawingml/2006/chart" xmlns:dgm="http://schemas.openxmlformats.org/drawingml/2006/diagram" xmlns:o="urn:schemas-microsoft-com:office:office" xmlns:v="urn:schemas-microsoft-com:vml" xmlns:pvml="urn:schemas-microsoft-com:office:powerpoint" xmlns:com="http://schemas.openxmlformats.org/drawingml/2006/compatibility" xmlns:p14="http://schemas.microsoft.com/office/powerpoint/2010/main" xmlns:p15="http://schemas.microsoft.com/office/powerpoint/2012/main" xmlns:ahyp="http://schemas.microsoft.com/office/drawing/2018/hyperlinkcolor" xmlns:go="http://customooxmlschemas.google.com/" r:id="rId29" roundtripDataSignature="AMtx7mitpBWG5YeMX40Xl6uG70rTNsLUEA=="/>
+      <go:slidesCustomData xmlns:go="http://customooxmlschemas.google.com/" xmlns:ahyp="http://schemas.microsoft.com/office/drawing/2018/hyperlinkcolor" xmlns:p15="http://schemas.microsoft.com/office/powerpoint/2012/main" xmlns:p14="http://schemas.microsoft.com/office/powerpoint/2010/main" xmlns:com="http://schemas.openxmlformats.org/drawingml/2006/compatibility" xmlns:pvml="urn:schemas-microsoft-com:office:powerpoint" xmlns:v="urn:schemas-microsoft-com:vml" xmlns:o="urn:schemas-microsoft-com:office:office" xmlns:dgm="http://schemas.openxmlformats.org/drawingml/2006/diagram" xmlns:c="http://schemas.openxmlformats.org/drawingml/2006/chart" xmlns:mv="urn:schemas-microsoft-com:mac:vml" xmlns:mc="http://schemas.openxmlformats.org/markup-compatibility/2006" xmlns="" r:id="rId29" roundtripDataSignature="AMtx7mitpBWG5YeMX40Xl6uG70rTNsLUEA=="/>
     </p:ext>
   </p:extLst>
 </p:presentation>
@@ -2711,10 +2711,10 @@
               <a:buNone/>
             </a:pPr>
             <a:r>
-              <a:rPr lang="en-US"/>
+              <a:rPr lang="en-US" dirty="0"/>
               <a:t>Explain the methodology that we followed before we move to the data sources. How were decisions made to go in the direction we went? </a:t>
             </a:r>
-            <a:endParaRPr/>
+            <a:endParaRPr dirty="0"/>
           </a:p>
           <a:p>
             <a:pPr marL="0" marR="0" lvl="0" indent="0" algn="l" rtl="0">
@@ -2734,7 +2734,7 @@
               <a:buFont typeface="Calibri"/>
               <a:buNone/>
             </a:pPr>
-            <a:endParaRPr/>
+            <a:endParaRPr dirty="0"/>
           </a:p>
           <a:p>
             <a:pPr marL="0" marR="0" lvl="0" indent="0" algn="l" rtl="0">
@@ -2755,10 +2755,10 @@
               <a:buNone/>
             </a:pPr>
             <a:r>
-              <a:rPr lang="en-US" sz="1500"/>
+              <a:rPr lang="en-US" sz="1500" dirty="0"/>
               <a:t>Defining what the project would look like down the road was very difficult at the conception phase when we didn’t have enough knowledge of the technologies we will have to use. Coming up with the main purpose the application will serve was elusive and we were exploring the suggested data sources. After the initial brainstorming, it became apparent that the Salary information will play a key role and we began to search for a data sources that will have plenty of postings with disclosed salary and at the same time will have open public APIs.   </a:t>
             </a:r>
-            <a:endParaRPr sz="1500"/>
+            <a:endParaRPr sz="1500" dirty="0"/>
           </a:p>
           <a:p>
             <a:pPr marL="0" marR="0" lvl="0" indent="0" algn="l" rtl="0">
@@ -2778,7 +2778,7 @@
               <a:buFont typeface="Calibri"/>
               <a:buNone/>
             </a:pPr>
-            <a:endParaRPr sz="1500"/>
+            <a:endParaRPr sz="1500" dirty="0"/>
           </a:p>
           <a:p>
             <a:pPr marL="0" marR="0" lvl="0" indent="0" algn="l" rtl="0">
@@ -2799,10 +2799,38 @@
               <a:buNone/>
             </a:pPr>
             <a:r>
-              <a:rPr lang="en-US" sz="1500"/>
-              <a:t>Explain that we started with the exploration of the provided data sources. We decided that we want to split the project into microservices and that they should be implemented by Docker containers. Using microservices in application development offers a number of benefits: Scalability, Flexibility in Technology, CI/CD is easier, App Crash prevention, Better Maintainability, Improved Productivity, Reusable Code, Granular Scaling. To manage the workload the microservices are a good option to split the tasks between the project members. </a:t>
-            </a:r>
-            <a:endParaRPr sz="1500"/>
+              <a:rPr lang="en-US" sz="1500" dirty="0"/>
+              <a:t>Explain that we started with the exploration of the provided data sources. We decided that we want to split the project into </a:t>
+            </a:r>
+            <a:r>
+              <a:rPr lang="en-US" sz="1500" dirty="0" err="1"/>
+              <a:t>microservices</a:t>
+            </a:r>
+            <a:r>
+              <a:rPr lang="en-US" sz="1500" dirty="0"/>
+              <a:t> and that they should be implemented by Docker containers. </a:t>
+            </a:r>
+            <a:r>
+              <a:rPr lang="en-US" sz="1500" dirty="0" smtClean="0"/>
+              <a:t>Using </a:t>
+            </a:r>
+            <a:r>
+              <a:rPr lang="en-US" sz="1500" dirty="0" err="1" smtClean="0"/>
+              <a:t>microservices</a:t>
+            </a:r>
+            <a:r>
+              <a:rPr lang="en-US" sz="1500" dirty="0" smtClean="0"/>
+              <a:t> in application development offers a number of benefits: Scalability, Flexibility in Technology, CI/CD is easier, App Crash prevention, Better Maintainability, Improved Productivity, Reusable Code, Granular Scaling. To manage the workload the </a:t>
+            </a:r>
+            <a:r>
+              <a:rPr lang="en-US" sz="1500" dirty="0" err="1" smtClean="0"/>
+              <a:t>microservices</a:t>
+            </a:r>
+            <a:r>
+              <a:rPr lang="en-US" sz="1500" dirty="0" smtClean="0"/>
+              <a:t> are a good option to split the tasks between the project members. </a:t>
+            </a:r>
+            <a:endParaRPr sz="1500" dirty="0" smtClean="0"/>
           </a:p>
           <a:p>
             <a:pPr marL="0" marR="0" lvl="0" indent="0" algn="l" rtl="0">
@@ -2822,7 +2850,7 @@
               <a:buFont typeface="Calibri"/>
               <a:buNone/>
             </a:pPr>
-            <a:endParaRPr sz="1500"/>
+            <a:endParaRPr sz="1500" dirty="0" smtClean="0"/>
           </a:p>
           <a:p>
             <a:pPr marL="0" lvl="0" indent="0" algn="l" rtl="0">
@@ -2840,10 +2868,22 @@
               <a:buNone/>
             </a:pPr>
             <a:r>
-              <a:rPr lang="en-US" sz="1500"/>
-              <a:t>Why Docker is a good choice - Consistent Environment, Isolated Environments, Portable (physical or virtual), Complements Microservice Architecture (managing them independently), Rapid Deployment and Scaling, Suitable for CI/CD.</a:t>
-            </a:r>
-            <a:endParaRPr sz="1500"/>
+              <a:rPr lang="en-US" sz="1500" dirty="0" smtClean="0"/>
+              <a:t>Why </a:t>
+            </a:r>
+            <a:r>
+              <a:rPr lang="en-US" sz="1500" dirty="0"/>
+              <a:t>Docker is a good choice - Consistent Environment, Isolated Environments, Portable (physical or virtual), Complements </a:t>
+            </a:r>
+            <a:r>
+              <a:rPr lang="en-US" sz="1500" dirty="0" err="1"/>
+              <a:t>Microservice</a:t>
+            </a:r>
+            <a:r>
+              <a:rPr lang="en-US" sz="1500" dirty="0"/>
+              <a:t> Architecture (managing them independently), Rapid Deployment and Scaling, Suitable for CI/CD.</a:t>
+            </a:r>
+            <a:endParaRPr sz="1500" u="sng" dirty="0"/>
           </a:p>
           <a:p>
             <a:pPr marL="0" lvl="0" indent="0" algn="l" rtl="0">
@@ -2860,7 +2900,7 @@
               <a:buFont typeface="Calibri"/>
               <a:buNone/>
             </a:pPr>
-            <a:endParaRPr sz="1500"/>
+            <a:endParaRPr sz="1500" dirty="0"/>
           </a:p>
           <a:p>
             <a:pPr marL="0" lvl="0" indent="0" algn="l" rtl="0">
@@ -2878,10 +2918,26 @@
               <a:buNone/>
             </a:pPr>
             <a:r>
-              <a:rPr lang="en-US" sz="1500"/>
-              <a:t>Why Postgres is a good choice - Because of Advanced SQL Compliance, Performance and Scalability, Open-source approach, Multi-platform Support, PostgreSQL is often chosen for applications that require dependable data integrity, robust feature support, and customizable solutions without the high costs associated with other enterprise database systems. Whether it's a complex system with high transaction rates or a simple application requiring a reliable and light database, Postgres is frequently a top choice.</a:t>
-            </a:r>
-            <a:endParaRPr sz="1500"/>
+              <a:rPr lang="en-US" sz="1500" dirty="0"/>
+              <a:t>Why </a:t>
+            </a:r>
+            <a:r>
+              <a:rPr lang="en-US" sz="1500" dirty="0" err="1"/>
+              <a:t>Postgres</a:t>
+            </a:r>
+            <a:r>
+              <a:rPr lang="en-US" sz="1500" dirty="0"/>
+              <a:t> is a good choice - Because of Advanced SQL Compliance, Performance and Scalability, Open-source approach, Multi-platform Support, PostgreSQL is often chosen for applications that require dependable data integrity, robust feature support, and customizable solutions without the high costs associated with other enterprise database systems. Whether it's a complex system with high transaction rates or a simple application requiring a reliable and light database, </a:t>
+            </a:r>
+            <a:r>
+              <a:rPr lang="en-US" sz="1500" dirty="0" err="1"/>
+              <a:t>Postgres</a:t>
+            </a:r>
+            <a:r>
+              <a:rPr lang="en-US" sz="1500" dirty="0"/>
+              <a:t> is frequently a top choice.</a:t>
+            </a:r>
+            <a:endParaRPr sz="1500" dirty="0"/>
           </a:p>
           <a:p>
             <a:pPr marL="0" marR="0" lvl="0" indent="0" algn="l" rtl="0">
@@ -2901,7 +2957,7 @@
               <a:buFont typeface="Calibri"/>
               <a:buNone/>
             </a:pPr>
-            <a:endParaRPr sz="1500"/>
+            <a:endParaRPr sz="1500" dirty="0"/>
           </a:p>
           <a:p>
             <a:pPr marL="0" marR="0" lvl="0" indent="0" algn="l" rtl="0">
@@ -2922,10 +2978,26 @@
               <a:buNone/>
             </a:pPr>
             <a:r>
-              <a:rPr lang="en-US" sz="1500"/>
-              <a:t>Initially we created two databases, MongoDB would hold the raw data and after transformation we would store the useful data into Postgres. MongoDB is a popular NoSQL database known for its flexibility, scalability, and performance, particularly well-suited for applications that handle large volumes of unstructured data. However, down the road, the Postgres service became more sophisticated and the MongoDB became redundant.</a:t>
-            </a:r>
-            <a:endParaRPr sz="1500"/>
+              <a:rPr lang="en-US" sz="1500" dirty="0"/>
+              <a:t>Initially we created two databases, MongoDB would hold the raw data and after transformation we would store the useful data into </a:t>
+            </a:r>
+            <a:r>
+              <a:rPr lang="en-US" sz="1500" dirty="0" err="1"/>
+              <a:t>Postgres</a:t>
+            </a:r>
+            <a:r>
+              <a:rPr lang="en-US" sz="1500" dirty="0"/>
+              <a:t>. MongoDB is a popular NoSQL database known for its flexibility, scalability, and performance, particularly well-suited for applications that handle large volumes of unstructured data. However, down the road, the </a:t>
+            </a:r>
+            <a:r>
+              <a:rPr lang="en-US" sz="1500" dirty="0" err="1"/>
+              <a:t>Postgres</a:t>
+            </a:r>
+            <a:r>
+              <a:rPr lang="en-US" sz="1500" dirty="0"/>
+              <a:t> service became more sophisticated and the MongoDB became redundant.</a:t>
+            </a:r>
+            <a:endParaRPr sz="1500" dirty="0"/>
           </a:p>
           <a:p>
             <a:pPr marL="0" marR="0" lvl="0" indent="0" algn="l" rtl="0">
@@ -2945,7 +3017,7 @@
               <a:buFont typeface="Calibri"/>
               <a:buNone/>
             </a:pPr>
-            <a:endParaRPr sz="1500"/>
+            <a:endParaRPr sz="1500" dirty="0"/>
           </a:p>
           <a:p>
             <a:pPr marL="0" marR="0" lvl="0" indent="0" algn="l" rtl="0">
@@ -2966,10 +3038,34 @@
               <a:buNone/>
             </a:pPr>
             <a:r>
-              <a:rPr lang="en-US" sz="1500"/>
-              <a:t>Using Uvicorn as the server for FastAPI applications offers a host of benefits that make it a compelling choice for developers:High Performance, Asynchronous Support, Automatic Interactive API Documentation, Modern Python Features, Development Speed and Ease of Use.</a:t>
-            </a:r>
-            <a:endParaRPr sz="1500"/>
+              <a:rPr lang="en-US" sz="1500" dirty="0"/>
+              <a:t>Using </a:t>
+            </a:r>
+            <a:r>
+              <a:rPr lang="en-US" sz="1500" dirty="0" err="1"/>
+              <a:t>Uvicorn</a:t>
+            </a:r>
+            <a:r>
+              <a:rPr lang="en-US" sz="1500" dirty="0"/>
+              <a:t> as the server for </a:t>
+            </a:r>
+            <a:r>
+              <a:rPr lang="en-US" sz="1500" dirty="0" err="1"/>
+              <a:t>FastAPI</a:t>
+            </a:r>
+            <a:r>
+              <a:rPr lang="en-US" sz="1500" dirty="0"/>
+              <a:t> applications offers a host of benefits that make it a compelling choice for </a:t>
+            </a:r>
+            <a:r>
+              <a:rPr lang="en-US" sz="1500" dirty="0" err="1"/>
+              <a:t>developers:High</a:t>
+            </a:r>
+            <a:r>
+              <a:rPr lang="en-US" sz="1500" dirty="0"/>
+              <a:t> Performance, Asynchronous Support, Automatic Interactive API Documentation, Modern Python Features, Development Speed and Ease of Use.</a:t>
+            </a:r>
+            <a:endParaRPr sz="1500" dirty="0"/>
           </a:p>
           <a:p>
             <a:pPr marL="0" marR="0" lvl="0" indent="0" algn="l" rtl="0">
@@ -2989,7 +3085,7 @@
               <a:buFont typeface="Calibri"/>
               <a:buNone/>
             </a:pPr>
-            <a:endParaRPr/>
+            <a:endParaRPr dirty="0"/>
           </a:p>
           <a:p>
             <a:pPr marL="0" marR="0" lvl="0" indent="0" algn="l" rtl="0">
@@ -3010,10 +3106,82 @@
               <a:buNone/>
             </a:pPr>
             <a:r>
-              <a:rPr lang="en-US"/>
-              <a:t>REMARK: - microservices (chatgpt) - docker container - postgres database for transformed data -&gt; efficient and consumes little storage (chatgpt) - mongodb for raw and application data because flexible schema -&gt; easy to adept (removed during the project), api server: uvicorn from fastAPI because easy to use</a:t>
-            </a:r>
-            <a:endParaRPr/>
+              <a:rPr lang="en-US" dirty="0"/>
+              <a:t>REMARK: - </a:t>
+            </a:r>
+            <a:r>
+              <a:rPr lang="en-US" dirty="0" err="1"/>
+              <a:t>microservices</a:t>
+            </a:r>
+            <a:r>
+              <a:rPr lang="en-US" dirty="0"/>
+              <a:t> (</a:t>
+            </a:r>
+            <a:r>
+              <a:rPr lang="en-US" dirty="0" err="1"/>
+              <a:t>chatgpt</a:t>
+            </a:r>
+            <a:r>
+              <a:rPr lang="en-US" dirty="0"/>
+              <a:t>) - </a:t>
+            </a:r>
+            <a:r>
+              <a:rPr lang="en-US" dirty="0" err="1"/>
+              <a:t>docker</a:t>
+            </a:r>
+            <a:r>
+              <a:rPr lang="en-US" dirty="0"/>
+              <a:t> container - </a:t>
+            </a:r>
+            <a:r>
+              <a:rPr lang="en-US" dirty="0" err="1"/>
+              <a:t>postgres</a:t>
+            </a:r>
+            <a:r>
+              <a:rPr lang="en-US" dirty="0"/>
+              <a:t> database for transformed data -&gt; efficient and consumes little storage (</a:t>
+            </a:r>
+            <a:r>
+              <a:rPr lang="en-US" dirty="0" err="1"/>
+              <a:t>chatgpt</a:t>
+            </a:r>
+            <a:r>
+              <a:rPr lang="en-US" dirty="0"/>
+              <a:t>) - </a:t>
+            </a:r>
+            <a:r>
+              <a:rPr lang="en-US" dirty="0" err="1"/>
+              <a:t>mongodb</a:t>
+            </a:r>
+            <a:r>
+              <a:rPr lang="en-US" dirty="0"/>
+              <a:t> for raw and application data because flexible schema -&gt; easy to adept (removed during the project), </a:t>
+            </a:r>
+            <a:r>
+              <a:rPr lang="en-US" dirty="0" err="1"/>
+              <a:t>api</a:t>
+            </a:r>
+            <a:r>
+              <a:rPr lang="en-US" dirty="0"/>
+              <a:t> server: </a:t>
+            </a:r>
+            <a:r>
+              <a:rPr lang="en-US" dirty="0" err="1"/>
+              <a:t>uvicorn</a:t>
+            </a:r>
+            <a:r>
+              <a:rPr lang="en-US" dirty="0"/>
+              <a:t> from </a:t>
+            </a:r>
+            <a:r>
+              <a:rPr lang="en-US" dirty="0" err="1"/>
+              <a:t>fastAPI</a:t>
+            </a:r>
+            <a:r>
+              <a:rPr lang="en-US" dirty="0"/>
+              <a:t> because easy to use</a:t>
+            </a:r>
+            <a:endParaRPr dirty="0"/>
           </a:p>
           <a:p>
             <a:pPr marL="0" marR="0" lvl="0" indent="0" algn="l" rtl="0">
@@ -3033,7 +3201,7 @@
               <a:buFont typeface="Calibri"/>
               <a:buNone/>
             </a:pPr>
-            <a:endParaRPr/>
+            <a:endParaRPr dirty="0"/>
           </a:p>
           <a:p>
             <a:pPr marL="0" lvl="0" indent="0" algn="l" rtl="0">
@@ -3045,7 +3213,7 @@
               </a:spcAft>
               <a:buNone/>
             </a:pPr>
-            <a:endParaRPr/>
+            <a:endParaRPr dirty="0"/>
           </a:p>
         </p:txBody>
       </p:sp>
@@ -3210,10 +3378,10 @@
               <a:buNone/>
             </a:pPr>
             <a:r>
-              <a:rPr lang="en-US" sz="1500"/>
+              <a:rPr lang="en-US" sz="1500" dirty="0"/>
               <a:t>This application relies on job boards with public API, treating each of them as an essential source of salary information, job title categorization and job descriptions. The list we evaluated at the start is as follows - arbeitnow.com, jobicy.com, jooble.org, okjob.io, reed.co.uk, themuse.com, and adzuna.com. As well as Indeed.com, Glassdoor.com, LinkedIn.com, but these providers have protection against data scraping. </a:t>
             </a:r>
-            <a:endParaRPr sz="1500"/>
+            <a:endParaRPr sz="1500" dirty="0"/>
           </a:p>
           <a:p>
             <a:pPr marL="0" lvl="0" indent="0" algn="l" rtl="0">
@@ -3226,7 +3394,7 @@
               <a:buSzPts val="1200"/>
               <a:buNone/>
             </a:pPr>
-            <a:endParaRPr sz="1500"/>
+            <a:endParaRPr sz="1500" dirty="0"/>
           </a:p>
           <a:p>
             <a:pPr marL="0" lvl="0" indent="0" algn="l" rtl="0">
@@ -3240,10 +3408,10 @@
               <a:buNone/>
             </a:pPr>
             <a:r>
-              <a:rPr lang="en-US" sz="1500"/>
+              <a:rPr lang="en-US" sz="1500" dirty="0"/>
               <a:t>We pivoted toward job boards that will offer as much overlap as possible and will provide Salary information. Thus, the following sources have been selected:</a:t>
             </a:r>
-            <a:endParaRPr sz="1500"/>
+            <a:endParaRPr sz="1500" dirty="0"/>
           </a:p>
           <a:p>
             <a:pPr marL="0" lvl="0" indent="0" algn="l" rtl="0">
@@ -3256,7 +3424,7 @@
               <a:buSzPts val="1200"/>
               <a:buNone/>
             </a:pPr>
-            <a:endParaRPr sz="1500"/>
+            <a:endParaRPr sz="1500" dirty="0"/>
           </a:p>
           <a:p>
             <a:pPr marL="0" lvl="0" indent="0" algn="l" rtl="0">
@@ -3270,10 +3438,58 @@
               <a:buNone/>
             </a:pPr>
             <a:r>
-              <a:rPr lang="en-US" sz="1500"/>
-              <a:t>Reed - jobTitle, locationName, minimumSalary, maximumSalary, currency, jobDescription, jobUrl, date;</a:t>
-            </a:r>
-            <a:endParaRPr sz="1500"/>
+              <a:rPr lang="en-US" sz="1500" dirty="0"/>
+              <a:t>Reed - </a:t>
+            </a:r>
+            <a:r>
+              <a:rPr lang="en-US" sz="1500" dirty="0" err="1"/>
+              <a:t>jobTitle</a:t>
+            </a:r>
+            <a:r>
+              <a:rPr lang="en-US" sz="1500" dirty="0"/>
+              <a:t>, </a:t>
+            </a:r>
+            <a:r>
+              <a:rPr lang="en-US" sz="1500" dirty="0" err="1"/>
+              <a:t>locationName</a:t>
+            </a:r>
+            <a:r>
+              <a:rPr lang="en-US" sz="1500" dirty="0"/>
+              <a:t>, </a:t>
+            </a:r>
+            <a:r>
+              <a:rPr lang="en-US" sz="1500" dirty="0" err="1"/>
+              <a:t>minimumSalary</a:t>
+            </a:r>
+            <a:r>
+              <a:rPr lang="en-US" sz="1500" dirty="0"/>
+              <a:t>, </a:t>
+            </a:r>
+            <a:r>
+              <a:rPr lang="en-US" sz="1500" dirty="0" err="1"/>
+              <a:t>maximumSalary</a:t>
+            </a:r>
+            <a:r>
+              <a:rPr lang="en-US" sz="1500" dirty="0"/>
+              <a:t>, currency, </a:t>
+            </a:r>
+            <a:r>
+              <a:rPr lang="en-US" sz="1500" dirty="0" err="1"/>
+              <a:t>jobDescription</a:t>
+            </a:r>
+            <a:r>
+              <a:rPr lang="en-US" sz="1500" dirty="0"/>
+              <a:t>, </a:t>
+            </a:r>
+            <a:r>
+              <a:rPr lang="en-US" sz="1500" dirty="0" err="1"/>
+              <a:t>jobUrl</a:t>
+            </a:r>
+            <a:r>
+              <a:rPr lang="en-US" sz="1500" dirty="0"/>
+              <a:t>, date;</a:t>
+            </a:r>
+            <a:endParaRPr sz="1500" dirty="0"/>
           </a:p>
           <a:p>
             <a:pPr marL="0" lvl="0" indent="0" algn="l" rtl="0">
@@ -3287,10 +3503,14 @@
               <a:buNone/>
             </a:pPr>
             <a:r>
-              <a:rPr lang="en-US" sz="1500"/>
-              <a:t>OkJob - Job-Title, Location, Salary-Min, Salary-Max, Job-Description, Job-Type(Remote,100% Salary, Four Days), Job-Tags(SaaS), Job-Category (IT), Hours, Apply-Link</a:t>
-            </a:r>
-            <a:endParaRPr sz="1500"/>
+              <a:rPr lang="en-US" sz="1500" dirty="0" err="1"/>
+              <a:t>OkJob</a:t>
+            </a:r>
+            <a:r>
+              <a:rPr lang="en-US" sz="1500" dirty="0"/>
+              <a:t> - Job-Title, Location, Salary-Min, Salary-Max, Job-Description, Job-Type(Remote,100% Salary, Four Days), Job-Tags(SaaS), Job-Category (IT), Hours, Apply-Link</a:t>
+            </a:r>
+            <a:endParaRPr sz="1500" dirty="0"/>
           </a:p>
           <a:p>
             <a:pPr marL="0" lvl="0" indent="0" algn="l" rtl="0">
@@ -3304,10 +3524,62 @@
               <a:buNone/>
             </a:pPr>
             <a:r>
-              <a:rPr lang="en-US" sz="1500"/>
-              <a:t>TheMuse - short_name, locations, contents(description includes Salary - &lt;br&gt;$16.00 - $24.00&lt;br&gt;&lt;br&gt;This pay range represents the base hourly rate or base annual full-time salary), levels(Junior), categories, landing_page, tags, publication_date </a:t>
-            </a:r>
-            <a:endParaRPr sz="1500"/>
+              <a:rPr lang="en-US" sz="1500" dirty="0" err="1"/>
+              <a:t>TheMuse</a:t>
+            </a:r>
+            <a:r>
+              <a:rPr lang="en-US" sz="1500" dirty="0"/>
+              <a:t> - </a:t>
+            </a:r>
+            <a:r>
+              <a:rPr lang="en-US" sz="1500" dirty="0" err="1"/>
+              <a:t>short_name</a:t>
+            </a:r>
+            <a:r>
+              <a:rPr lang="en-US" sz="1500" dirty="0"/>
+              <a:t>, locations, contents(description includes Salary - &lt;</a:t>
+            </a:r>
+            <a:r>
+              <a:rPr lang="en-US" sz="1500" dirty="0" err="1"/>
+              <a:t>br</a:t>
+            </a:r>
+            <a:r>
+              <a:rPr lang="en-US" sz="1500" dirty="0"/>
+              <a:t>&gt;$16.00 - $24.00&lt;</a:t>
+            </a:r>
+            <a:r>
+              <a:rPr lang="en-US" sz="1500" dirty="0" err="1"/>
+              <a:t>br</a:t>
+            </a:r>
+            <a:r>
+              <a:rPr lang="en-US" sz="1500" dirty="0"/>
+              <a:t>&gt;&lt;</a:t>
+            </a:r>
+            <a:r>
+              <a:rPr lang="en-US" sz="1500" dirty="0" err="1"/>
+              <a:t>br</a:t>
+            </a:r>
+            <a:r>
+              <a:rPr lang="en-US" sz="1500" dirty="0"/>
+              <a:t>&gt;This pay range represents the base hourly rate or base annual full-time salary), levels(Junior), categories, </a:t>
+            </a:r>
+            <a:r>
+              <a:rPr lang="en-US" sz="1500" dirty="0" err="1"/>
+              <a:t>landing_page</a:t>
+            </a:r>
+            <a:r>
+              <a:rPr lang="en-US" sz="1500" dirty="0"/>
+              <a:t>, tags, </a:t>
+            </a:r>
+            <a:r>
+              <a:rPr lang="en-US" sz="1500" dirty="0" err="1"/>
+              <a:t>publication_date</a:t>
+            </a:r>
+            <a:r>
+              <a:rPr lang="en-US" sz="1500" dirty="0"/>
+              <a:t> </a:t>
+            </a:r>
+            <a:endParaRPr sz="1500" dirty="0"/>
           </a:p>
           <a:p>
             <a:pPr marL="0" lvl="0" indent="0" algn="l" rtl="0">
@@ -3320,7 +3592,7 @@
               <a:buSzPts val="1200"/>
               <a:buNone/>
             </a:pPr>
-            <a:endParaRPr sz="1500"/>
+            <a:endParaRPr sz="1500" dirty="0"/>
           </a:p>
           <a:p>
             <a:pPr marL="0" lvl="0" indent="0" algn="l" rtl="0">
@@ -3333,7 +3605,7 @@
               <a:buSzPts val="1200"/>
               <a:buNone/>
             </a:pPr>
-            <a:endParaRPr sz="1500"/>
+            <a:endParaRPr sz="1500" dirty="0"/>
           </a:p>
           <a:p>
             <a:pPr marL="0" lvl="0" indent="0" algn="l" rtl="0">
@@ -3350,7 +3622,7 @@
               <a:buFont typeface="Calibri"/>
               <a:buNone/>
             </a:pPr>
-            <a:endParaRPr sz="1500"/>
+            <a:endParaRPr sz="1500" dirty="0"/>
           </a:p>
         </p:txBody>
       </p:sp>
@@ -5976,7 +6248,7 @@
         <p14:vortex dir="r"/>
       </p:transition>
     </mc:Choice>
-    <mc:Fallback xmlns="" xmlns:mv="urn:schemas-microsoft-com:mac:vml" xmlns:c="http://schemas.openxmlformats.org/drawingml/2006/chart" xmlns:dgm="http://schemas.openxmlformats.org/drawingml/2006/diagram" xmlns:o="urn:schemas-microsoft-com:office:office" xmlns:v="urn:schemas-microsoft-com:vml" xmlns:pvml="urn:schemas-microsoft-com:office:powerpoint" xmlns:com="http://schemas.openxmlformats.org/drawingml/2006/compatibility" xmlns:p15="http://schemas.microsoft.com/office/powerpoint/2012/main" xmlns:ahyp="http://schemas.microsoft.com/office/drawing/2018/hyperlinkcolor">
+    <mc:Fallback xmlns:ahyp="http://schemas.microsoft.com/office/drawing/2018/hyperlinkcolor" xmlns:p15="http://schemas.microsoft.com/office/powerpoint/2012/main" xmlns:com="http://schemas.openxmlformats.org/drawingml/2006/compatibility" xmlns:pvml="urn:schemas-microsoft-com:office:powerpoint" xmlns:v="urn:schemas-microsoft-com:vml" xmlns:o="urn:schemas-microsoft-com:office:office" xmlns:dgm="http://schemas.openxmlformats.org/drawingml/2006/diagram" xmlns:c="http://schemas.openxmlformats.org/drawingml/2006/chart" xmlns:mv="urn:schemas-microsoft-com:mac:vml" xmlns="">
       <p:transition spd="med">
         <p:fade/>
       </p:transition>
@@ -6691,7 +6963,7 @@
         <p14:vortex dir="r"/>
       </p:transition>
     </mc:Choice>
-    <mc:Fallback xmlns="" xmlns:mv="urn:schemas-microsoft-com:mac:vml" xmlns:c="http://schemas.openxmlformats.org/drawingml/2006/chart" xmlns:dgm="http://schemas.openxmlformats.org/drawingml/2006/diagram" xmlns:o="urn:schemas-microsoft-com:office:office" xmlns:v="urn:schemas-microsoft-com:vml" xmlns:pvml="urn:schemas-microsoft-com:office:powerpoint" xmlns:com="http://schemas.openxmlformats.org/drawingml/2006/compatibility" xmlns:p15="http://schemas.microsoft.com/office/powerpoint/2012/main" xmlns:ahyp="http://schemas.microsoft.com/office/drawing/2018/hyperlinkcolor">
+    <mc:Fallback xmlns:ahyp="http://schemas.microsoft.com/office/drawing/2018/hyperlinkcolor" xmlns:p15="http://schemas.microsoft.com/office/powerpoint/2012/main" xmlns:com="http://schemas.openxmlformats.org/drawingml/2006/compatibility" xmlns:pvml="urn:schemas-microsoft-com:office:powerpoint" xmlns:v="urn:schemas-microsoft-com:vml" xmlns:o="urn:schemas-microsoft-com:office:office" xmlns:dgm="http://schemas.openxmlformats.org/drawingml/2006/diagram" xmlns:c="http://schemas.openxmlformats.org/drawingml/2006/chart" xmlns:mv="urn:schemas-microsoft-com:mac:vml" xmlns="">
       <p:transition spd="med">
         <p:fade/>
       </p:transition>
@@ -7410,7 +7682,7 @@
         <p14:vortex dir="r"/>
       </p:transition>
     </mc:Choice>
-    <mc:Fallback xmlns="" xmlns:mv="urn:schemas-microsoft-com:mac:vml" xmlns:c="http://schemas.openxmlformats.org/drawingml/2006/chart" xmlns:dgm="http://schemas.openxmlformats.org/drawingml/2006/diagram" xmlns:o="urn:schemas-microsoft-com:office:office" xmlns:v="urn:schemas-microsoft-com:vml" xmlns:pvml="urn:schemas-microsoft-com:office:powerpoint" xmlns:com="http://schemas.openxmlformats.org/drawingml/2006/compatibility" xmlns:p15="http://schemas.microsoft.com/office/powerpoint/2012/main" xmlns:ahyp="http://schemas.microsoft.com/office/drawing/2018/hyperlinkcolor">
+    <mc:Fallback xmlns:ahyp="http://schemas.microsoft.com/office/drawing/2018/hyperlinkcolor" xmlns:p15="http://schemas.microsoft.com/office/powerpoint/2012/main" xmlns:com="http://schemas.openxmlformats.org/drawingml/2006/compatibility" xmlns:pvml="urn:schemas-microsoft-com:office:powerpoint" xmlns:v="urn:schemas-microsoft-com:vml" xmlns:o="urn:schemas-microsoft-com:office:office" xmlns:dgm="http://schemas.openxmlformats.org/drawingml/2006/diagram" xmlns:c="http://schemas.openxmlformats.org/drawingml/2006/chart" xmlns:mv="urn:schemas-microsoft-com:mac:vml" xmlns="">
       <p:transition spd="med">
         <p:fade/>
       </p:transition>
@@ -8381,7 +8653,7 @@
         <p14:vortex dir="r"/>
       </p:transition>
     </mc:Choice>
-    <mc:Fallback xmlns="" xmlns:mv="urn:schemas-microsoft-com:mac:vml" xmlns:c="http://schemas.openxmlformats.org/drawingml/2006/chart" xmlns:dgm="http://schemas.openxmlformats.org/drawingml/2006/diagram" xmlns:o="urn:schemas-microsoft-com:office:office" xmlns:v="urn:schemas-microsoft-com:vml" xmlns:pvml="urn:schemas-microsoft-com:office:powerpoint" xmlns:com="http://schemas.openxmlformats.org/drawingml/2006/compatibility" xmlns:p15="http://schemas.microsoft.com/office/powerpoint/2012/main" xmlns:ahyp="http://schemas.microsoft.com/office/drawing/2018/hyperlinkcolor">
+    <mc:Fallback xmlns:ahyp="http://schemas.microsoft.com/office/drawing/2018/hyperlinkcolor" xmlns:p15="http://schemas.microsoft.com/office/powerpoint/2012/main" xmlns:com="http://schemas.openxmlformats.org/drawingml/2006/compatibility" xmlns:pvml="urn:schemas-microsoft-com:office:powerpoint" xmlns:v="urn:schemas-microsoft-com:vml" xmlns:o="urn:schemas-microsoft-com:office:office" xmlns:dgm="http://schemas.openxmlformats.org/drawingml/2006/diagram" xmlns:c="http://schemas.openxmlformats.org/drawingml/2006/chart" xmlns:mv="urn:schemas-microsoft-com:mac:vml" xmlns="">
       <p:transition spd="med">
         <p:fade/>
       </p:transition>
@@ -9100,7 +9372,7 @@
         <p14:vortex dir="r"/>
       </p:transition>
     </mc:Choice>
-    <mc:Fallback xmlns="" xmlns:mv="urn:schemas-microsoft-com:mac:vml" xmlns:c="http://schemas.openxmlformats.org/drawingml/2006/chart" xmlns:dgm="http://schemas.openxmlformats.org/drawingml/2006/diagram" xmlns:o="urn:schemas-microsoft-com:office:office" xmlns:v="urn:schemas-microsoft-com:vml" xmlns:pvml="urn:schemas-microsoft-com:office:powerpoint" xmlns:com="http://schemas.openxmlformats.org/drawingml/2006/compatibility" xmlns:p15="http://schemas.microsoft.com/office/powerpoint/2012/main" xmlns:ahyp="http://schemas.microsoft.com/office/drawing/2018/hyperlinkcolor">
+    <mc:Fallback xmlns:ahyp="http://schemas.microsoft.com/office/drawing/2018/hyperlinkcolor" xmlns:p15="http://schemas.microsoft.com/office/powerpoint/2012/main" xmlns:com="http://schemas.openxmlformats.org/drawingml/2006/compatibility" xmlns:pvml="urn:schemas-microsoft-com:office:powerpoint" xmlns:v="urn:schemas-microsoft-com:vml" xmlns:o="urn:schemas-microsoft-com:office:office" xmlns:dgm="http://schemas.openxmlformats.org/drawingml/2006/diagram" xmlns:c="http://schemas.openxmlformats.org/drawingml/2006/chart" xmlns:mv="urn:schemas-microsoft-com:mac:vml" xmlns="">
       <p:transition spd="med">
         <p:fade/>
       </p:transition>
@@ -10070,7 +10342,7 @@
         <p14:vortex dir="r"/>
       </p:transition>
     </mc:Choice>
-    <mc:Fallback xmlns="" xmlns:mv="urn:schemas-microsoft-com:mac:vml" xmlns:c="http://schemas.openxmlformats.org/drawingml/2006/chart" xmlns:dgm="http://schemas.openxmlformats.org/drawingml/2006/diagram" xmlns:o="urn:schemas-microsoft-com:office:office" xmlns:v="urn:schemas-microsoft-com:vml" xmlns:pvml="urn:schemas-microsoft-com:office:powerpoint" xmlns:com="http://schemas.openxmlformats.org/drawingml/2006/compatibility" xmlns:p15="http://schemas.microsoft.com/office/powerpoint/2012/main" xmlns:ahyp="http://schemas.microsoft.com/office/drawing/2018/hyperlinkcolor">
+    <mc:Fallback xmlns:ahyp="http://schemas.microsoft.com/office/drawing/2018/hyperlinkcolor" xmlns:p15="http://schemas.microsoft.com/office/powerpoint/2012/main" xmlns:com="http://schemas.openxmlformats.org/drawingml/2006/compatibility" xmlns:pvml="urn:schemas-microsoft-com:office:powerpoint" xmlns:v="urn:schemas-microsoft-com:vml" xmlns:o="urn:schemas-microsoft-com:office:office" xmlns:dgm="http://schemas.openxmlformats.org/drawingml/2006/diagram" xmlns:c="http://schemas.openxmlformats.org/drawingml/2006/chart" xmlns:mv="urn:schemas-microsoft-com:mac:vml" xmlns="">
       <p:transition spd="med">
         <p:fade/>
       </p:transition>
@@ -10926,7 +11198,7 @@
         <p14:vortex dir="r"/>
       </p:transition>
     </mc:Choice>
-    <mc:Fallback xmlns="" xmlns:mv="urn:schemas-microsoft-com:mac:vml" xmlns:c="http://schemas.openxmlformats.org/drawingml/2006/chart" xmlns:dgm="http://schemas.openxmlformats.org/drawingml/2006/diagram" xmlns:o="urn:schemas-microsoft-com:office:office" xmlns:v="urn:schemas-microsoft-com:vml" xmlns:pvml="urn:schemas-microsoft-com:office:powerpoint" xmlns:com="http://schemas.openxmlformats.org/drawingml/2006/compatibility" xmlns:p15="http://schemas.microsoft.com/office/powerpoint/2012/main" xmlns:ahyp="http://schemas.microsoft.com/office/drawing/2018/hyperlinkcolor">
+    <mc:Fallback xmlns:ahyp="http://schemas.microsoft.com/office/drawing/2018/hyperlinkcolor" xmlns:p15="http://schemas.microsoft.com/office/powerpoint/2012/main" xmlns:com="http://schemas.openxmlformats.org/drawingml/2006/compatibility" xmlns:pvml="urn:schemas-microsoft-com:office:powerpoint" xmlns:v="urn:schemas-microsoft-com:vml" xmlns:o="urn:schemas-microsoft-com:office:office" xmlns:dgm="http://schemas.openxmlformats.org/drawingml/2006/diagram" xmlns:c="http://schemas.openxmlformats.org/drawingml/2006/chart" xmlns:mv="urn:schemas-microsoft-com:mac:vml" xmlns="">
       <p:transition spd="med">
         <p:fade/>
       </p:transition>
@@ -11609,7 +11881,7 @@
         <p14:vortex dir="r"/>
       </p:transition>
     </mc:Choice>
-    <mc:Fallback xmlns="" xmlns:mv="urn:schemas-microsoft-com:mac:vml" xmlns:c="http://schemas.openxmlformats.org/drawingml/2006/chart" xmlns:dgm="http://schemas.openxmlformats.org/drawingml/2006/diagram" xmlns:o="urn:schemas-microsoft-com:office:office" xmlns:v="urn:schemas-microsoft-com:vml" xmlns:pvml="urn:schemas-microsoft-com:office:powerpoint" xmlns:com="http://schemas.openxmlformats.org/drawingml/2006/compatibility" xmlns:p15="http://schemas.microsoft.com/office/powerpoint/2012/main" xmlns:ahyp="http://schemas.microsoft.com/office/drawing/2018/hyperlinkcolor">
+    <mc:Fallback xmlns:ahyp="http://schemas.microsoft.com/office/drawing/2018/hyperlinkcolor" xmlns:p15="http://schemas.microsoft.com/office/powerpoint/2012/main" xmlns:com="http://schemas.openxmlformats.org/drawingml/2006/compatibility" xmlns:pvml="urn:schemas-microsoft-com:office:powerpoint" xmlns:v="urn:schemas-microsoft-com:vml" xmlns:o="urn:schemas-microsoft-com:office:office" xmlns:dgm="http://schemas.openxmlformats.org/drawingml/2006/diagram" xmlns:c="http://schemas.openxmlformats.org/drawingml/2006/chart" xmlns:mv="urn:schemas-microsoft-com:mac:vml" xmlns="">
       <p:transition spd="med">
         <p:fade/>
       </p:transition>
@@ -12291,7 +12563,7 @@
         <p14:vortex dir="r"/>
       </p:transition>
     </mc:Choice>
-    <mc:Fallback xmlns="" xmlns:mv="urn:schemas-microsoft-com:mac:vml" xmlns:c="http://schemas.openxmlformats.org/drawingml/2006/chart" xmlns:dgm="http://schemas.openxmlformats.org/drawingml/2006/diagram" xmlns:o="urn:schemas-microsoft-com:office:office" xmlns:v="urn:schemas-microsoft-com:vml" xmlns:pvml="urn:schemas-microsoft-com:office:powerpoint" xmlns:com="http://schemas.openxmlformats.org/drawingml/2006/compatibility" xmlns:p15="http://schemas.microsoft.com/office/powerpoint/2012/main" xmlns:ahyp="http://schemas.microsoft.com/office/drawing/2018/hyperlinkcolor">
+    <mc:Fallback xmlns:ahyp="http://schemas.microsoft.com/office/drawing/2018/hyperlinkcolor" xmlns:p15="http://schemas.microsoft.com/office/powerpoint/2012/main" xmlns:com="http://schemas.openxmlformats.org/drawingml/2006/compatibility" xmlns:pvml="urn:schemas-microsoft-com:office:powerpoint" xmlns:v="urn:schemas-microsoft-com:vml" xmlns:o="urn:schemas-microsoft-com:office:office" xmlns:dgm="http://schemas.openxmlformats.org/drawingml/2006/diagram" xmlns:c="http://schemas.openxmlformats.org/drawingml/2006/chart" xmlns:mv="urn:schemas-microsoft-com:mac:vml" xmlns="">
       <p:transition spd="med">
         <p:fade/>
       </p:transition>
@@ -12973,7 +13245,7 @@
         <p14:vortex dir="r"/>
       </p:transition>
     </mc:Choice>
-    <mc:Fallback xmlns="" xmlns:mv="urn:schemas-microsoft-com:mac:vml" xmlns:c="http://schemas.openxmlformats.org/drawingml/2006/chart" xmlns:dgm="http://schemas.openxmlformats.org/drawingml/2006/diagram" xmlns:o="urn:schemas-microsoft-com:office:office" xmlns:v="urn:schemas-microsoft-com:vml" xmlns:pvml="urn:schemas-microsoft-com:office:powerpoint" xmlns:com="http://schemas.openxmlformats.org/drawingml/2006/compatibility" xmlns:p15="http://schemas.microsoft.com/office/powerpoint/2012/main" xmlns:ahyp="http://schemas.microsoft.com/office/drawing/2018/hyperlinkcolor">
+    <mc:Fallback xmlns:ahyp="http://schemas.microsoft.com/office/drawing/2018/hyperlinkcolor" xmlns:p15="http://schemas.microsoft.com/office/powerpoint/2012/main" xmlns:com="http://schemas.openxmlformats.org/drawingml/2006/compatibility" xmlns:pvml="urn:schemas-microsoft-com:office:powerpoint" xmlns:v="urn:schemas-microsoft-com:vml" xmlns:o="urn:schemas-microsoft-com:office:office" xmlns:dgm="http://schemas.openxmlformats.org/drawingml/2006/diagram" xmlns:c="http://schemas.openxmlformats.org/drawingml/2006/chart" xmlns:mv="urn:schemas-microsoft-com:mac:vml" xmlns="">
       <p:transition spd="med">
         <p:fade/>
       </p:transition>
@@ -13386,7 +13658,7 @@
         <p14:vortex dir="r"/>
       </p:transition>
     </mc:Choice>
-    <mc:Fallback xmlns="" xmlns:mv="urn:schemas-microsoft-com:mac:vml" xmlns:c="http://schemas.openxmlformats.org/drawingml/2006/chart" xmlns:dgm="http://schemas.openxmlformats.org/drawingml/2006/diagram" xmlns:o="urn:schemas-microsoft-com:office:office" xmlns:v="urn:schemas-microsoft-com:vml" xmlns:pvml="urn:schemas-microsoft-com:office:powerpoint" xmlns:com="http://schemas.openxmlformats.org/drawingml/2006/compatibility" xmlns:p15="http://schemas.microsoft.com/office/powerpoint/2012/main" xmlns:ahyp="http://schemas.microsoft.com/office/drawing/2018/hyperlinkcolor">
+    <mc:Fallback xmlns:ahyp="http://schemas.microsoft.com/office/drawing/2018/hyperlinkcolor" xmlns:p15="http://schemas.microsoft.com/office/powerpoint/2012/main" xmlns:com="http://schemas.openxmlformats.org/drawingml/2006/compatibility" xmlns:pvml="urn:schemas-microsoft-com:office:powerpoint" xmlns:v="urn:schemas-microsoft-com:vml" xmlns:o="urn:schemas-microsoft-com:office:office" xmlns:dgm="http://schemas.openxmlformats.org/drawingml/2006/diagram" xmlns:c="http://schemas.openxmlformats.org/drawingml/2006/chart" xmlns:mv="urn:schemas-microsoft-com:mac:vml" xmlns="">
       <p:transition spd="med">
         <p:fade/>
       </p:transition>
@@ -14105,7 +14377,7 @@
         <p14:vortex dir="r"/>
       </p:transition>
     </mc:Choice>
-    <mc:Fallback xmlns="" xmlns:mv="urn:schemas-microsoft-com:mac:vml" xmlns:c="http://schemas.openxmlformats.org/drawingml/2006/chart" xmlns:dgm="http://schemas.openxmlformats.org/drawingml/2006/diagram" xmlns:o="urn:schemas-microsoft-com:office:office" xmlns:v="urn:schemas-microsoft-com:vml" xmlns:pvml="urn:schemas-microsoft-com:office:powerpoint" xmlns:com="http://schemas.openxmlformats.org/drawingml/2006/compatibility" xmlns:p15="http://schemas.microsoft.com/office/powerpoint/2012/main" xmlns:ahyp="http://schemas.microsoft.com/office/drawing/2018/hyperlinkcolor">
+    <mc:Fallback xmlns:ahyp="http://schemas.microsoft.com/office/drawing/2018/hyperlinkcolor" xmlns:p15="http://schemas.microsoft.com/office/powerpoint/2012/main" xmlns:com="http://schemas.openxmlformats.org/drawingml/2006/compatibility" xmlns:pvml="urn:schemas-microsoft-com:office:powerpoint" xmlns:v="urn:schemas-microsoft-com:vml" xmlns:o="urn:schemas-microsoft-com:office:office" xmlns:dgm="http://schemas.openxmlformats.org/drawingml/2006/diagram" xmlns:c="http://schemas.openxmlformats.org/drawingml/2006/chart" xmlns:mv="urn:schemas-microsoft-com:mac:vml" xmlns="">
       <p:transition spd="med">
         <p:fade/>
       </p:transition>
@@ -14920,7 +15192,7 @@
         <p14:vortex dir="r"/>
       </p:transition>
     </mc:Choice>
-    <mc:Fallback xmlns="" xmlns:mv="urn:schemas-microsoft-com:mac:vml" xmlns:c="http://schemas.openxmlformats.org/drawingml/2006/chart" xmlns:dgm="http://schemas.openxmlformats.org/drawingml/2006/diagram" xmlns:o="urn:schemas-microsoft-com:office:office" xmlns:v="urn:schemas-microsoft-com:vml" xmlns:pvml="urn:schemas-microsoft-com:office:powerpoint" xmlns:com="http://schemas.openxmlformats.org/drawingml/2006/compatibility" xmlns:p15="http://schemas.microsoft.com/office/powerpoint/2012/main" xmlns:ahyp="http://schemas.microsoft.com/office/drawing/2018/hyperlinkcolor">
+    <mc:Fallback xmlns:ahyp="http://schemas.microsoft.com/office/drawing/2018/hyperlinkcolor" xmlns:p15="http://schemas.microsoft.com/office/powerpoint/2012/main" xmlns:com="http://schemas.openxmlformats.org/drawingml/2006/compatibility" xmlns:pvml="urn:schemas-microsoft-com:office:powerpoint" xmlns:v="urn:schemas-microsoft-com:vml" xmlns:o="urn:schemas-microsoft-com:office:office" xmlns:dgm="http://schemas.openxmlformats.org/drawingml/2006/diagram" xmlns:c="http://schemas.openxmlformats.org/drawingml/2006/chart" xmlns:mv="urn:schemas-microsoft-com:mac:vml" xmlns="">
       <p:transition spd="med">
         <p:fade/>
       </p:transition>
@@ -16010,7 +16282,7 @@
         <p14:vortex dir="r"/>
       </p:transition>
     </mc:Choice>
-    <mc:Fallback xmlns="" xmlns:mv="urn:schemas-microsoft-com:mac:vml" xmlns:c="http://schemas.openxmlformats.org/drawingml/2006/chart" xmlns:dgm="http://schemas.openxmlformats.org/drawingml/2006/diagram" xmlns:o="urn:schemas-microsoft-com:office:office" xmlns:v="urn:schemas-microsoft-com:vml" xmlns:pvml="urn:schemas-microsoft-com:office:powerpoint" xmlns:com="http://schemas.openxmlformats.org/drawingml/2006/compatibility" xmlns:p15="http://schemas.microsoft.com/office/powerpoint/2012/main" xmlns:ahyp="http://schemas.microsoft.com/office/drawing/2018/hyperlinkcolor">
+    <mc:Fallback xmlns:ahyp="http://schemas.microsoft.com/office/drawing/2018/hyperlinkcolor" xmlns:p15="http://schemas.microsoft.com/office/powerpoint/2012/main" xmlns:com="http://schemas.openxmlformats.org/drawingml/2006/compatibility" xmlns:pvml="urn:schemas-microsoft-com:office:powerpoint" xmlns:v="urn:schemas-microsoft-com:vml" xmlns:o="urn:schemas-microsoft-com:office:office" xmlns:dgm="http://schemas.openxmlformats.org/drawingml/2006/diagram" xmlns:c="http://schemas.openxmlformats.org/drawingml/2006/chart" xmlns:mv="urn:schemas-microsoft-com:mac:vml" xmlns="">
       <p:transition spd="med">
         <p:fade/>
       </p:transition>
@@ -16559,7 +16831,7 @@
         <p14:vortex dir="r"/>
       </p:transition>
     </mc:Choice>
-    <mc:Fallback xmlns="" xmlns:mv="urn:schemas-microsoft-com:mac:vml" xmlns:c="http://schemas.openxmlformats.org/drawingml/2006/chart" xmlns:dgm="http://schemas.openxmlformats.org/drawingml/2006/diagram" xmlns:o="urn:schemas-microsoft-com:office:office" xmlns:v="urn:schemas-microsoft-com:vml" xmlns:pvml="urn:schemas-microsoft-com:office:powerpoint" xmlns:com="http://schemas.openxmlformats.org/drawingml/2006/compatibility" xmlns:p15="http://schemas.microsoft.com/office/powerpoint/2012/main" xmlns:ahyp="http://schemas.microsoft.com/office/drawing/2018/hyperlinkcolor">
+    <mc:Fallback xmlns:ahyp="http://schemas.microsoft.com/office/drawing/2018/hyperlinkcolor" xmlns:p15="http://schemas.microsoft.com/office/powerpoint/2012/main" xmlns:com="http://schemas.openxmlformats.org/drawingml/2006/compatibility" xmlns:pvml="urn:schemas-microsoft-com:office:powerpoint" xmlns:v="urn:schemas-microsoft-com:vml" xmlns:o="urn:schemas-microsoft-com:office:office" xmlns:dgm="http://schemas.openxmlformats.org/drawingml/2006/diagram" xmlns:c="http://schemas.openxmlformats.org/drawingml/2006/chart" xmlns:mv="urn:schemas-microsoft-com:mac:vml" xmlns="">
       <p:transition spd="med">
         <p:fade/>
       </p:transition>
@@ -17375,7 +17647,7 @@
         <p14:vortex dir="r"/>
       </p:transition>
     </mc:Choice>
-    <mc:Fallback xmlns="" xmlns:mv="urn:schemas-microsoft-com:mac:vml" xmlns:c="http://schemas.openxmlformats.org/drawingml/2006/chart" xmlns:dgm="http://schemas.openxmlformats.org/drawingml/2006/diagram" xmlns:o="urn:schemas-microsoft-com:office:office" xmlns:v="urn:schemas-microsoft-com:vml" xmlns:pvml="urn:schemas-microsoft-com:office:powerpoint" xmlns:com="http://schemas.openxmlformats.org/drawingml/2006/compatibility" xmlns:p15="http://schemas.microsoft.com/office/powerpoint/2012/main" xmlns:ahyp="http://schemas.microsoft.com/office/drawing/2018/hyperlinkcolor">
+    <mc:Fallback xmlns:ahyp="http://schemas.microsoft.com/office/drawing/2018/hyperlinkcolor" xmlns:p15="http://schemas.microsoft.com/office/powerpoint/2012/main" xmlns:com="http://schemas.openxmlformats.org/drawingml/2006/compatibility" xmlns:pvml="urn:schemas-microsoft-com:office:powerpoint" xmlns:v="urn:schemas-microsoft-com:vml" xmlns:o="urn:schemas-microsoft-com:office:office" xmlns:dgm="http://schemas.openxmlformats.org/drawingml/2006/diagram" xmlns:c="http://schemas.openxmlformats.org/drawingml/2006/chart" xmlns:mv="urn:schemas-microsoft-com:mac:vml" xmlns="">
       <p:transition spd="med">
         <p:fade/>
       </p:transition>
@@ -18090,7 +18362,7 @@
         <p14:vortex dir="r"/>
       </p:transition>
     </mc:Choice>
-    <mc:Fallback xmlns="" xmlns:mv="urn:schemas-microsoft-com:mac:vml" xmlns:c="http://schemas.openxmlformats.org/drawingml/2006/chart" xmlns:dgm="http://schemas.openxmlformats.org/drawingml/2006/diagram" xmlns:o="urn:schemas-microsoft-com:office:office" xmlns:v="urn:schemas-microsoft-com:vml" xmlns:pvml="urn:schemas-microsoft-com:office:powerpoint" xmlns:com="http://schemas.openxmlformats.org/drawingml/2006/compatibility" xmlns:p15="http://schemas.microsoft.com/office/powerpoint/2012/main" xmlns:ahyp="http://schemas.microsoft.com/office/drawing/2018/hyperlinkcolor">
+    <mc:Fallback xmlns:ahyp="http://schemas.microsoft.com/office/drawing/2018/hyperlinkcolor" xmlns:p15="http://schemas.microsoft.com/office/powerpoint/2012/main" xmlns:com="http://schemas.openxmlformats.org/drawingml/2006/compatibility" xmlns:pvml="urn:schemas-microsoft-com:office:powerpoint" xmlns:v="urn:schemas-microsoft-com:vml" xmlns:o="urn:schemas-microsoft-com:office:office" xmlns:dgm="http://schemas.openxmlformats.org/drawingml/2006/diagram" xmlns:c="http://schemas.openxmlformats.org/drawingml/2006/chart" xmlns:mv="urn:schemas-microsoft-com:mac:vml" xmlns="">
       <p:transition spd="med">
         <p:fade/>
       </p:transition>
@@ -19464,7 +19736,7 @@
         <p14:vortex dir="r"/>
       </p:transition>
     </mc:Choice>
-    <mc:Fallback xmlns="" xmlns:mv="urn:schemas-microsoft-com:mac:vml" xmlns:c="http://schemas.openxmlformats.org/drawingml/2006/chart" xmlns:dgm="http://schemas.openxmlformats.org/drawingml/2006/diagram" xmlns:o="urn:schemas-microsoft-com:office:office" xmlns:v="urn:schemas-microsoft-com:vml" xmlns:pvml="urn:schemas-microsoft-com:office:powerpoint" xmlns:com="http://schemas.openxmlformats.org/drawingml/2006/compatibility" xmlns:p15="http://schemas.microsoft.com/office/powerpoint/2012/main" xmlns:ahyp="http://schemas.microsoft.com/office/drawing/2018/hyperlinkcolor">
+    <mc:Fallback xmlns:ahyp="http://schemas.microsoft.com/office/drawing/2018/hyperlinkcolor" xmlns:p15="http://schemas.microsoft.com/office/powerpoint/2012/main" xmlns:com="http://schemas.openxmlformats.org/drawingml/2006/compatibility" xmlns:pvml="urn:schemas-microsoft-com:office:powerpoint" xmlns:v="urn:schemas-microsoft-com:vml" xmlns:o="urn:schemas-microsoft-com:office:office" xmlns:dgm="http://schemas.openxmlformats.org/drawingml/2006/diagram" xmlns:c="http://schemas.openxmlformats.org/drawingml/2006/chart" xmlns:mv="urn:schemas-microsoft-com:mac:vml" xmlns="">
       <p:transition spd="med">
         <p:fade/>
       </p:transition>
@@ -22925,13 +23197,13 @@
               <a:rPr lang="en-US" sz="1800" b="1" dirty="0">
                 <a:latin typeface="Corbel" panose="020B0503020204020204" pitchFamily="34" charset="0"/>
               </a:rPr>
-              <a:t>	</a:t>
+              <a:t> </a:t>
             </a:r>
             <a:r>
               <a:rPr lang="en-US" sz="1800" b="1" dirty="0" smtClean="0">
                 <a:latin typeface="Corbel" panose="020B0503020204020204" pitchFamily="34" charset="0"/>
               </a:rPr>
-              <a:t>info</a:t>
+              <a:t>         info</a:t>
             </a:r>
             <a:r>
               <a:rPr lang="en-US" sz="1800" b="1" dirty="0">
@@ -23865,164 +24137,6 @@
           <a:chExt cx="0" cy="0"/>
         </a:xfrm>
       </p:grpSpPr>
-      <p:sp>
-        <p:nvSpPr>
-          <p:cNvPr id="169" name="Google Shape;169;p3"/>
-          <p:cNvSpPr txBox="1"/>
-          <p:nvPr/>
-        </p:nvSpPr>
-        <p:spPr>
-          <a:xfrm>
-            <a:off x="1536200" y="4570400"/>
-            <a:ext cx="4055400" cy="1200600"/>
-          </a:xfrm>
-          <a:prstGeom prst="rect">
-            <a:avLst/>
-          </a:prstGeom>
-          <a:noFill/>
-          <a:ln>
-            <a:noFill/>
-          </a:ln>
-        </p:spPr>
-        <p:txBody>
-          <a:bodyPr spcFirstLastPara="1" wrap="square" lIns="91425" tIns="45700" rIns="91425" bIns="45700" anchor="t" anchorCtr="0">
-            <a:spAutoFit/>
-          </a:bodyPr>
-          <a:lstStyle/>
-          <a:p>
-            <a:pPr marL="285750" marR="0" lvl="0" indent="-285750" algn="l" rtl="0">
-              <a:lnSpc>
-                <a:spcPct val="150000"/>
-              </a:lnSpc>
-              <a:spcBef>
-                <a:spcPts val="0"/>
-              </a:spcBef>
-              <a:spcAft>
-                <a:spcPts val="0"/>
-              </a:spcAft>
-              <a:buClr>
-                <a:schemeClr val="dk1"/>
-              </a:buClr>
-              <a:buSzPts val="1800"/>
-              <a:buFont typeface="Corbel"/>
-              <a:buChar char="•"/>
-            </a:pPr>
-            <a:r>
-              <a:rPr lang="en-US" sz="1800" dirty="0">
-                <a:solidFill>
-                  <a:schemeClr val="dk1"/>
-                </a:solidFill>
-                <a:latin typeface="Corbel"/>
-                <a:ea typeface="Corbel"/>
-                <a:cs typeface="Corbel"/>
-                <a:sym typeface="Corbel"/>
-              </a:rPr>
-              <a:t>Data Source Exploration</a:t>
-            </a:r>
-            <a:endParaRPr sz="1800" dirty="0">
-              <a:solidFill>
-                <a:schemeClr val="dk1"/>
-              </a:solidFill>
-              <a:latin typeface="Corbel"/>
-              <a:ea typeface="Corbel"/>
-              <a:cs typeface="Corbel"/>
-              <a:sym typeface="Corbel"/>
-            </a:endParaRPr>
-          </a:p>
-          <a:p>
-            <a:pPr marL="285750" marR="0" lvl="0" indent="-285750" algn="l" rtl="0">
-              <a:lnSpc>
-                <a:spcPct val="150000"/>
-              </a:lnSpc>
-              <a:spcBef>
-                <a:spcPts val="0"/>
-              </a:spcBef>
-              <a:spcAft>
-                <a:spcPts val="0"/>
-              </a:spcAft>
-              <a:buClr>
-                <a:schemeClr val="dk1"/>
-              </a:buClr>
-              <a:buSzPts val="1800"/>
-              <a:buFont typeface="Corbel"/>
-              <a:buChar char="•"/>
-            </a:pPr>
-            <a:r>
-              <a:rPr lang="en-US" sz="1800" dirty="0" err="1">
-                <a:solidFill>
-                  <a:schemeClr val="dk1"/>
-                </a:solidFill>
-                <a:latin typeface="Corbel"/>
-                <a:ea typeface="Corbel"/>
-                <a:cs typeface="Corbel"/>
-                <a:sym typeface="Corbel"/>
-              </a:rPr>
-              <a:t>Microservices</a:t>
-            </a:r>
-            <a:r>
-              <a:rPr lang="en-US" sz="1800" dirty="0">
-                <a:solidFill>
-                  <a:schemeClr val="dk1"/>
-                </a:solidFill>
-                <a:latin typeface="Corbel"/>
-                <a:ea typeface="Corbel"/>
-                <a:cs typeface="Corbel"/>
-                <a:sym typeface="Corbel"/>
-              </a:rPr>
-              <a:t> Decision</a:t>
-            </a:r>
-            <a:endParaRPr sz="1800" dirty="0">
-              <a:solidFill>
-                <a:schemeClr val="dk1"/>
-              </a:solidFill>
-              <a:latin typeface="Corbel"/>
-              <a:ea typeface="Corbel"/>
-              <a:cs typeface="Corbel"/>
-              <a:sym typeface="Corbel"/>
-            </a:endParaRPr>
-          </a:p>
-          <a:p>
-            <a:pPr marL="285750" marR="0" lvl="0" indent="-285750" algn="l" rtl="0">
-              <a:lnSpc>
-                <a:spcPct val="150000"/>
-              </a:lnSpc>
-              <a:spcBef>
-                <a:spcPts val="0"/>
-              </a:spcBef>
-              <a:spcAft>
-                <a:spcPts val="0"/>
-              </a:spcAft>
-              <a:buClr>
-                <a:schemeClr val="dk1"/>
-              </a:buClr>
-              <a:buSzPts val="1800"/>
-              <a:buFont typeface="Corbel"/>
-              <a:buChar char="•"/>
-            </a:pPr>
-            <a:r>
-              <a:rPr lang="en-US" sz="1800" dirty="0">
-                <a:solidFill>
-                  <a:schemeClr val="dk1"/>
-                </a:solidFill>
-                <a:latin typeface="Corbel"/>
-                <a:ea typeface="Corbel"/>
-                <a:cs typeface="Corbel"/>
-                <a:sym typeface="Corbel"/>
-              </a:rPr>
-              <a:t>Docker Benefits</a:t>
-            </a:r>
-            <a:endParaRPr sz="1800" dirty="0">
-              <a:solidFill>
-                <a:schemeClr val="dk1"/>
-              </a:solidFill>
-              <a:latin typeface="Corbel"/>
-              <a:ea typeface="Corbel"/>
-              <a:cs typeface="Corbel"/>
-              <a:sym typeface="Corbel"/>
-            </a:endParaRPr>
-          </a:p>
-        </p:txBody>
-      </p:sp>
       <p:pic>
         <p:nvPicPr>
           <p:cNvPr id="170" name="Google Shape;170;p3"/>
@@ -24038,8 +24152,8 @@
         </p:blipFill>
         <p:spPr>
           <a:xfrm>
-            <a:off x="1536200" y="933200"/>
-            <a:ext cx="6870076" cy="2415300"/>
+            <a:off x="1536200" y="933201"/>
+            <a:ext cx="6870076" cy="2111657"/>
           </a:xfrm>
           <a:prstGeom prst="rect">
             <a:avLst/>
@@ -24163,188 +24277,42 @@
           </a:p>
         </p:txBody>
       </p:sp>
-      <p:sp>
-        <p:nvSpPr>
-          <p:cNvPr id="173" name="Google Shape;173;p3"/>
-          <p:cNvSpPr txBox="1"/>
+      <p:pic>
+        <p:nvPicPr>
+          <p:cNvPr id="2" name="Picture 1"/>
+          <p:cNvPicPr>
+            <a:picLocks noChangeAspect="1"/>
+          </p:cNvPicPr>
           <p:nvPr/>
-        </p:nvSpPr>
+        </p:nvPicPr>
+        <p:blipFill>
+          <a:blip r:embed="rId5">
+            <a:extLst>
+              <a:ext uri="{28A0092B-C50C-407E-A947-70E740481C1C}">
+                <a14:useLocalDpi xmlns:a14="http://schemas.microsoft.com/office/drawing/2010/main" val="0"/>
+              </a:ext>
+            </a:extLst>
+          </a:blip>
+          <a:stretch>
+            <a:fillRect/>
+          </a:stretch>
+        </p:blipFill>
         <p:spPr>
           <a:xfrm>
-            <a:off x="5483700" y="4495100"/>
-            <a:ext cx="2713500" cy="1675300"/>
+            <a:off x="2114430" y="3931815"/>
+            <a:ext cx="2766300" cy="2423370"/>
           </a:xfrm>
           <a:prstGeom prst="rect">
             <a:avLst/>
           </a:prstGeom>
-          <a:noFill/>
           <a:ln>
             <a:noFill/>
           </a:ln>
+          <a:effectLst>
+            <a:softEdge rad="112500"/>
+          </a:effectLst>
         </p:spPr>
-        <p:txBody>
-          <a:bodyPr spcFirstLastPara="1" wrap="square" lIns="91425" tIns="91425" rIns="91425" bIns="91425" anchor="t" anchorCtr="0">
-            <a:noAutofit/>
-          </a:bodyPr>
-          <a:lstStyle/>
-          <a:p>
-            <a:pPr marL="457200" lvl="0" indent="-342900" algn="l" rtl="0">
-              <a:lnSpc>
-                <a:spcPct val="150000"/>
-              </a:lnSpc>
-              <a:spcBef>
-                <a:spcPts val="0"/>
-              </a:spcBef>
-              <a:spcAft>
-                <a:spcPts val="0"/>
-              </a:spcAft>
-              <a:buClr>
-                <a:schemeClr val="dk1"/>
-              </a:buClr>
-              <a:buSzPts val="1800"/>
-              <a:buFont typeface="Corbel"/>
-              <a:buChar char="●"/>
-            </a:pPr>
-            <a:r>
-              <a:rPr lang="en-US" sz="1800" dirty="0" err="1">
-                <a:solidFill>
-                  <a:schemeClr val="dk1"/>
-                </a:solidFill>
-                <a:latin typeface="Corbel"/>
-                <a:ea typeface="Corbel"/>
-                <a:cs typeface="Corbel"/>
-                <a:sym typeface="Corbel"/>
-              </a:rPr>
-              <a:t>Postgres</a:t>
-            </a:r>
-            <a:r>
-              <a:rPr lang="en-US" sz="1800" dirty="0">
-                <a:solidFill>
-                  <a:schemeClr val="dk1"/>
-                </a:solidFill>
-                <a:latin typeface="Corbel"/>
-                <a:ea typeface="Corbel"/>
-                <a:cs typeface="Corbel"/>
-                <a:sym typeface="Corbel"/>
-              </a:rPr>
-              <a:t> Advantages</a:t>
-            </a:r>
-            <a:endParaRPr sz="1800" dirty="0">
-              <a:solidFill>
-                <a:schemeClr val="dk1"/>
-              </a:solidFill>
-              <a:latin typeface="Corbel"/>
-              <a:ea typeface="Corbel"/>
-              <a:cs typeface="Corbel"/>
-              <a:sym typeface="Corbel"/>
-            </a:endParaRPr>
-          </a:p>
-          <a:p>
-            <a:pPr marL="457200" lvl="0" indent="-342900" algn="l" rtl="0">
-              <a:lnSpc>
-                <a:spcPct val="150000"/>
-              </a:lnSpc>
-              <a:spcBef>
-                <a:spcPts val="0"/>
-              </a:spcBef>
-              <a:spcAft>
-                <a:spcPts val="0"/>
-              </a:spcAft>
-              <a:buClr>
-                <a:schemeClr val="dk1"/>
-              </a:buClr>
-              <a:buSzPts val="1800"/>
-              <a:buFont typeface="Corbel"/>
-              <a:buChar char="●"/>
-            </a:pPr>
-            <a:r>
-              <a:rPr lang="en-US" sz="1800" dirty="0">
-                <a:solidFill>
-                  <a:schemeClr val="dk1"/>
-                </a:solidFill>
-                <a:latin typeface="Corbel"/>
-                <a:ea typeface="Corbel"/>
-                <a:cs typeface="Corbel"/>
-                <a:sym typeface="Corbel"/>
-              </a:rPr>
-              <a:t>Database Strategy</a:t>
-            </a:r>
-            <a:endParaRPr sz="1800" dirty="0">
-              <a:solidFill>
-                <a:schemeClr val="dk1"/>
-              </a:solidFill>
-              <a:latin typeface="Corbel"/>
-              <a:ea typeface="Corbel"/>
-              <a:cs typeface="Corbel"/>
-              <a:sym typeface="Corbel"/>
-            </a:endParaRPr>
-          </a:p>
-          <a:p>
-            <a:pPr marL="457200" lvl="0" indent="-342900" algn="l" rtl="0">
-              <a:lnSpc>
-                <a:spcPct val="150000"/>
-              </a:lnSpc>
-              <a:spcBef>
-                <a:spcPts val="0"/>
-              </a:spcBef>
-              <a:spcAft>
-                <a:spcPts val="0"/>
-              </a:spcAft>
-              <a:buClr>
-                <a:schemeClr val="dk1"/>
-              </a:buClr>
-              <a:buSzPts val="1800"/>
-              <a:buFont typeface="Corbel"/>
-              <a:buChar char="●"/>
-            </a:pPr>
-            <a:r>
-              <a:rPr lang="en-US" sz="1800" dirty="0" err="1">
-                <a:solidFill>
-                  <a:schemeClr val="dk1"/>
-                </a:solidFill>
-                <a:latin typeface="Corbel"/>
-                <a:ea typeface="Corbel"/>
-                <a:cs typeface="Corbel"/>
-                <a:sym typeface="Corbel"/>
-              </a:rPr>
-              <a:t>Uvicorn</a:t>
-            </a:r>
-            <a:r>
-              <a:rPr lang="en-US" sz="1800" dirty="0">
-                <a:solidFill>
-                  <a:schemeClr val="dk1"/>
-                </a:solidFill>
-                <a:latin typeface="Corbel"/>
-                <a:ea typeface="Corbel"/>
-                <a:cs typeface="Corbel"/>
-                <a:sym typeface="Corbel"/>
-              </a:rPr>
-              <a:t> for </a:t>
-            </a:r>
-            <a:r>
-              <a:rPr lang="en-US" sz="1800" dirty="0" err="1">
-                <a:solidFill>
-                  <a:schemeClr val="dk1"/>
-                </a:solidFill>
-                <a:latin typeface="Corbel"/>
-                <a:ea typeface="Corbel"/>
-                <a:cs typeface="Corbel"/>
-                <a:sym typeface="Corbel"/>
-              </a:rPr>
-              <a:t>FastAPI</a:t>
-            </a:r>
-            <a:endParaRPr sz="1900" dirty="0">
-              <a:solidFill>
-                <a:schemeClr val="dk1"/>
-              </a:solidFill>
-              <a:latin typeface="Corbel"/>
-              <a:ea typeface="Corbel"/>
-              <a:cs typeface="Corbel"/>
-              <a:sym typeface="Corbel"/>
-            </a:endParaRPr>
-          </a:p>
-        </p:txBody>
-      </p:sp>
+      </p:pic>
     </p:spTree>
   </p:cSld>
   <p:clrMapOvr>
@@ -24478,8 +24446,8 @@
         </p:nvSpPr>
         <p:spPr>
           <a:xfrm>
-            <a:off x="5946490" y="4358708"/>
-            <a:ext cx="5697300" cy="2367600"/>
+            <a:off x="5946490" y="3733014"/>
+            <a:ext cx="5697300" cy="2767051"/>
           </a:xfrm>
           <a:prstGeom prst="rect">
             <a:avLst/>
@@ -24681,34 +24649,6 @@
           </a:ln>
         </p:spPr>
       </p:pic>
-      <p:pic>
-        <p:nvPicPr>
-          <p:cNvPr id="185" name="Google Shape;185;p4"/>
-          <p:cNvPicPr preferRelativeResize="0"/>
-          <p:nvPr/>
-        </p:nvPicPr>
-        <p:blipFill>
-          <a:blip r:embed="rId7">
-            <a:alphaModFix/>
-          </a:blip>
-          <a:stretch>
-            <a:fillRect/>
-          </a:stretch>
-        </p:blipFill>
-        <p:spPr>
-          <a:xfrm>
-            <a:off x="8086675" y="3385425"/>
-            <a:ext cx="3557125" cy="961129"/>
-          </a:xfrm>
-          <a:prstGeom prst="rect">
-            <a:avLst/>
-          </a:prstGeom>
-          <a:noFill/>
-          <a:ln>
-            <a:noFill/>
-          </a:ln>
-        </p:spPr>
-      </p:pic>
     </p:spTree>
   </p:cSld>
   <p:clrMapOvr>
@@ -24865,7 +24805,7 @@
         <p14:flip dir="l"/>
       </p:transition>
     </mc:Choice>
-    <mc:Fallback xmlns="" xmlns:mv="urn:schemas-microsoft-com:mac:vml" xmlns:c="http://schemas.openxmlformats.org/drawingml/2006/chart" xmlns:dgm="http://schemas.openxmlformats.org/drawingml/2006/diagram" xmlns:o="urn:schemas-microsoft-com:office:office" xmlns:v="urn:schemas-microsoft-com:vml" xmlns:pvml="urn:schemas-microsoft-com:office:powerpoint" xmlns:com="http://schemas.openxmlformats.org/drawingml/2006/compatibility" xmlns:p15="http://schemas.microsoft.com/office/powerpoint/2012/main" xmlns:ahyp="http://schemas.microsoft.com/office/drawing/2018/hyperlinkcolor">
+    <mc:Fallback xmlns:ahyp="http://schemas.microsoft.com/office/drawing/2018/hyperlinkcolor" xmlns:p15="http://schemas.microsoft.com/office/powerpoint/2012/main" xmlns:com="http://schemas.openxmlformats.org/drawingml/2006/compatibility" xmlns:pvml="urn:schemas-microsoft-com:office:powerpoint" xmlns:v="urn:schemas-microsoft-com:vml" xmlns:o="urn:schemas-microsoft-com:office:office" xmlns:dgm="http://schemas.openxmlformats.org/drawingml/2006/diagram" xmlns:c="http://schemas.openxmlformats.org/drawingml/2006/chart" xmlns:mv="urn:schemas-microsoft-com:mac:vml" xmlns="">
       <p:transition spd="slow">
         <p:fade/>
       </p:transition>

</xml_diff>